<commit_message>
Change waitforkeypress to waitforbuttonpress in protocols so that mouse click is valid. Prompt mouse click instead of button in end figure.
</commit_message>
<xml_diff>
--- a/code/experiment/fixationscreen/ppts/SlideExpEnd.pptx
+++ b/code/experiment/fixationscreen/ppts/SlideExpEnd.pptx
@@ -197,7 +197,7 @@
           <a:p>
             <a:fld id="{17F8D589-F923-4547-B884-BBE1BAFEDD96}" type="datetimeFigureOut">
               <a:rPr lang="en-US" smtClean="0"/>
-              <a:t>12/6/23</a:t>
+              <a:t>6/14/24</a:t>
             </a:fld>
             <a:endParaRPr lang="en-US"/>
           </a:p>
@@ -684,7 +684,7 @@
           <a:p>
             <a:fld id="{7E566BE7-B388-5F42-A136-5D8181E60369}" type="datetimeFigureOut">
               <a:rPr lang="en-US" smtClean="0"/>
-              <a:t>12/6/23</a:t>
+              <a:t>6/14/24</a:t>
             </a:fld>
             <a:endParaRPr lang="en-US"/>
           </a:p>
@@ -854,7 +854,7 @@
           <a:p>
             <a:fld id="{7E566BE7-B388-5F42-A136-5D8181E60369}" type="datetimeFigureOut">
               <a:rPr lang="en-US" smtClean="0"/>
-              <a:t>12/6/23</a:t>
+              <a:t>6/14/24</a:t>
             </a:fld>
             <a:endParaRPr lang="en-US"/>
           </a:p>
@@ -1034,7 +1034,7 @@
           <a:p>
             <a:fld id="{7E566BE7-B388-5F42-A136-5D8181E60369}" type="datetimeFigureOut">
               <a:rPr lang="en-US" smtClean="0"/>
-              <a:t>12/6/23</a:t>
+              <a:t>6/14/24</a:t>
             </a:fld>
             <a:endParaRPr lang="en-US"/>
           </a:p>
@@ -1204,7 +1204,7 @@
           <a:p>
             <a:fld id="{7E566BE7-B388-5F42-A136-5D8181E60369}" type="datetimeFigureOut">
               <a:rPr lang="en-US" smtClean="0"/>
-              <a:t>12/6/23</a:t>
+              <a:t>6/14/24</a:t>
             </a:fld>
             <a:endParaRPr lang="en-US"/>
           </a:p>
@@ -1448,7 +1448,7 @@
           <a:p>
             <a:fld id="{7E566BE7-B388-5F42-A136-5D8181E60369}" type="datetimeFigureOut">
               <a:rPr lang="en-US" smtClean="0"/>
-              <a:t>12/6/23</a:t>
+              <a:t>6/14/24</a:t>
             </a:fld>
             <a:endParaRPr lang="en-US"/>
           </a:p>
@@ -1680,7 +1680,7 @@
           <a:p>
             <a:fld id="{7E566BE7-B388-5F42-A136-5D8181E60369}" type="datetimeFigureOut">
               <a:rPr lang="en-US" smtClean="0"/>
-              <a:t>12/6/23</a:t>
+              <a:t>6/14/24</a:t>
             </a:fld>
             <a:endParaRPr lang="en-US"/>
           </a:p>
@@ -2047,7 +2047,7 @@
           <a:p>
             <a:fld id="{7E566BE7-B388-5F42-A136-5D8181E60369}" type="datetimeFigureOut">
               <a:rPr lang="en-US" smtClean="0"/>
-              <a:t>12/6/23</a:t>
+              <a:t>6/14/24</a:t>
             </a:fld>
             <a:endParaRPr lang="en-US"/>
           </a:p>
@@ -2165,7 +2165,7 @@
           <a:p>
             <a:fld id="{7E566BE7-B388-5F42-A136-5D8181E60369}" type="datetimeFigureOut">
               <a:rPr lang="en-US" smtClean="0"/>
-              <a:t>12/6/23</a:t>
+              <a:t>6/14/24</a:t>
             </a:fld>
             <a:endParaRPr lang="en-US"/>
           </a:p>
@@ -2260,7 +2260,7 @@
           <a:p>
             <a:fld id="{7E566BE7-B388-5F42-A136-5D8181E60369}" type="datetimeFigureOut">
               <a:rPr lang="en-US" smtClean="0"/>
-              <a:t>12/6/23</a:t>
+              <a:t>6/14/24</a:t>
             </a:fld>
             <a:endParaRPr lang="en-US"/>
           </a:p>
@@ -2537,7 +2537,7 @@
           <a:p>
             <a:fld id="{7E566BE7-B388-5F42-A136-5D8181E60369}" type="datetimeFigureOut">
               <a:rPr lang="en-US" smtClean="0"/>
-              <a:t>12/6/23</a:t>
+              <a:t>6/14/24</a:t>
             </a:fld>
             <a:endParaRPr lang="en-US"/>
           </a:p>
@@ -2794,7 +2794,7 @@
           <a:p>
             <a:fld id="{7E566BE7-B388-5F42-A136-5D8181E60369}" type="datetimeFigureOut">
               <a:rPr lang="en-US" smtClean="0"/>
-              <a:t>12/6/23</a:t>
+              <a:t>6/14/24</a:t>
             </a:fld>
             <a:endParaRPr lang="en-US"/>
           </a:p>
@@ -3007,7 +3007,7 @@
           <a:p>
             <a:fld id="{7E566BE7-B388-5F42-A136-5D8181E60369}" type="datetimeFigureOut">
               <a:rPr lang="en-US" smtClean="0"/>
-              <a:t>12/6/23</a:t>
+              <a:t>6/14/24</a:t>
             </a:fld>
             <a:endParaRPr lang="en-US"/>
           </a:p>
@@ -3508,8 +3508,8 @@
         </p:nvSpPr>
         <p:spPr>
           <a:xfrm>
-            <a:off x="1510636" y="577975"/>
-            <a:ext cx="4751122" cy="2062103"/>
+            <a:off x="1411806" y="589698"/>
+            <a:ext cx="4948779" cy="2062103"/>
           </a:xfrm>
           <a:prstGeom prst="rect">
             <a:avLst/>
@@ -3533,7 +3533,7 @@
           <a:p>
             <a:r>
               <a:rPr lang="en-US" sz="3200" dirty="0"/>
-              <a:t>Press any key to continue.</a:t>
+              <a:t>Click the mouse to continue.</a:t>
             </a:r>
           </a:p>
         </p:txBody>

</xml_diff>